<commit_message>
User password encryption works, LoginUI update, README update
</commit_message>
<xml_diff>
--- a/Design.pptx
+++ b/Design.pptx
@@ -5,7 +5,8 @@
     <p:sldMasterId id="2147483648" r:id="rId1"/>
   </p:sldMasterIdLst>
   <p:sldIdLst>
-    <p:sldId id="256" r:id="rId2"/>
+    <p:sldId id="257" r:id="rId2"/>
+    <p:sldId id="256" r:id="rId3"/>
   </p:sldIdLst>
   <p:sldSz cx="12192000" cy="6858000"/>
   <p:notesSz cx="6858000" cy="9144000"/>
@@ -104,6 +105,11 @@
       </a:defRPr>
     </a:lvl9pPr>
   </p:defaultTextStyle>
+  <p:extLst>
+    <p:ext uri="{EFAFB233-063F-42B5-8137-9DF3F51BA10A}">
+      <p15:sldGuideLst xmlns:p15="http://schemas.microsoft.com/office/powerpoint/2012/main"/>
+    </p:ext>
+  </p:extLst>
 </p:presentation>
 </file>
 
@@ -254,7 +260,7 @@
           <a:p>
             <a:fld id="{7EB3A6FC-0647-486B-BD6D-1BD2B60AE37B}" type="datetimeFigureOut">
               <a:rPr lang="hu-HU" smtClean="0"/>
-              <a:t>2024. 09. 08.</a:t>
+              <a:t>2024. 09. 09.</a:t>
             </a:fld>
             <a:endParaRPr lang="hu-HU"/>
           </a:p>
@@ -452,7 +458,7 @@
           <a:p>
             <a:fld id="{7EB3A6FC-0647-486B-BD6D-1BD2B60AE37B}" type="datetimeFigureOut">
               <a:rPr lang="hu-HU" smtClean="0"/>
-              <a:t>2024. 09. 08.</a:t>
+              <a:t>2024. 09. 09.</a:t>
             </a:fld>
             <a:endParaRPr lang="hu-HU"/>
           </a:p>
@@ -660,7 +666,7 @@
           <a:p>
             <a:fld id="{7EB3A6FC-0647-486B-BD6D-1BD2B60AE37B}" type="datetimeFigureOut">
               <a:rPr lang="hu-HU" smtClean="0"/>
-              <a:t>2024. 09. 08.</a:t>
+              <a:t>2024. 09. 09.</a:t>
             </a:fld>
             <a:endParaRPr lang="hu-HU"/>
           </a:p>
@@ -858,7 +864,7 @@
           <a:p>
             <a:fld id="{7EB3A6FC-0647-486B-BD6D-1BD2B60AE37B}" type="datetimeFigureOut">
               <a:rPr lang="hu-HU" smtClean="0"/>
-              <a:t>2024. 09. 08.</a:t>
+              <a:t>2024. 09. 09.</a:t>
             </a:fld>
             <a:endParaRPr lang="hu-HU"/>
           </a:p>
@@ -1133,7 +1139,7 @@
           <a:p>
             <a:fld id="{7EB3A6FC-0647-486B-BD6D-1BD2B60AE37B}" type="datetimeFigureOut">
               <a:rPr lang="hu-HU" smtClean="0"/>
-              <a:t>2024. 09. 08.</a:t>
+              <a:t>2024. 09. 09.</a:t>
             </a:fld>
             <a:endParaRPr lang="hu-HU"/>
           </a:p>
@@ -1398,7 +1404,7 @@
           <a:p>
             <a:fld id="{7EB3A6FC-0647-486B-BD6D-1BD2B60AE37B}" type="datetimeFigureOut">
               <a:rPr lang="hu-HU" smtClean="0"/>
-              <a:t>2024. 09. 08.</a:t>
+              <a:t>2024. 09. 09.</a:t>
             </a:fld>
             <a:endParaRPr lang="hu-HU"/>
           </a:p>
@@ -1810,7 +1816,7 @@
           <a:p>
             <a:fld id="{7EB3A6FC-0647-486B-BD6D-1BD2B60AE37B}" type="datetimeFigureOut">
               <a:rPr lang="hu-HU" smtClean="0"/>
-              <a:t>2024. 09. 08.</a:t>
+              <a:t>2024. 09. 09.</a:t>
             </a:fld>
             <a:endParaRPr lang="hu-HU"/>
           </a:p>
@@ -1951,7 +1957,7 @@
           <a:p>
             <a:fld id="{7EB3A6FC-0647-486B-BD6D-1BD2B60AE37B}" type="datetimeFigureOut">
               <a:rPr lang="hu-HU" smtClean="0"/>
-              <a:t>2024. 09. 08.</a:t>
+              <a:t>2024. 09. 09.</a:t>
             </a:fld>
             <a:endParaRPr lang="hu-HU"/>
           </a:p>
@@ -2064,7 +2070,7 @@
           <a:p>
             <a:fld id="{7EB3A6FC-0647-486B-BD6D-1BD2B60AE37B}" type="datetimeFigureOut">
               <a:rPr lang="hu-HU" smtClean="0"/>
-              <a:t>2024. 09. 08.</a:t>
+              <a:t>2024. 09. 09.</a:t>
             </a:fld>
             <a:endParaRPr lang="hu-HU"/>
           </a:p>
@@ -2375,7 +2381,7 @@
           <a:p>
             <a:fld id="{7EB3A6FC-0647-486B-BD6D-1BD2B60AE37B}" type="datetimeFigureOut">
               <a:rPr lang="hu-HU" smtClean="0"/>
-              <a:t>2024. 09. 08.</a:t>
+              <a:t>2024. 09. 09.</a:t>
             </a:fld>
             <a:endParaRPr lang="hu-HU"/>
           </a:p>
@@ -2663,7 +2669,7 @@
           <a:p>
             <a:fld id="{7EB3A6FC-0647-486B-BD6D-1BD2B60AE37B}" type="datetimeFigureOut">
               <a:rPr lang="hu-HU" smtClean="0"/>
-              <a:t>2024. 09. 08.</a:t>
+              <a:t>2024. 09. 09.</a:t>
             </a:fld>
             <a:endParaRPr lang="hu-HU"/>
           </a:p>
@@ -2904,7 +2910,7 @@
           <a:p>
             <a:fld id="{7EB3A6FC-0647-486B-BD6D-1BD2B60AE37B}" type="datetimeFigureOut">
               <a:rPr lang="hu-HU" smtClean="0"/>
-              <a:t>2024. 09. 08.</a:t>
+              <a:t>2024. 09. 09.</a:t>
             </a:fld>
             <a:endParaRPr lang="hu-HU"/>
           </a:p>
@@ -3326,7 +3332,7 @@
           <p:cNvPr id="4" name="Téglalap 3">
             <a:extLst>
               <a:ext uri="{FF2B5EF4-FFF2-40B4-BE49-F238E27FC236}">
-                <a16:creationId xmlns:a16="http://schemas.microsoft.com/office/drawing/2014/main" id="{94EA9B0A-2FAF-D172-6FC3-53A6D4E0D423}"/>
+                <a16:creationId xmlns:a16="http://schemas.microsoft.com/office/drawing/2014/main" id="{6ECC2992-DA7C-6DC6-ADE4-1F717D2CF31E}"/>
               </a:ext>
             </a:extLst>
           </p:cNvPr>
@@ -3335,230 +3341,8 @@
         </p:nvSpPr>
         <p:spPr>
           <a:xfrm>
-            <a:off x="1749551" y="169164"/>
-            <a:ext cx="8692898" cy="6519672"/>
-          </a:xfrm>
-          <a:prstGeom prst="rect">
-            <a:avLst/>
-          </a:prstGeom>
-          <a:noFill/>
-          <a:ln>
-            <a:solidFill>
-              <a:schemeClr val="tx1"/>
-            </a:solidFill>
-          </a:ln>
-        </p:spPr>
-        <p:style>
-          <a:lnRef idx="2">
-            <a:schemeClr val="accent1">
-              <a:shade val="15000"/>
-            </a:schemeClr>
-          </a:lnRef>
-          <a:fillRef idx="1">
-            <a:schemeClr val="accent1"/>
-          </a:fillRef>
-          <a:effectRef idx="0">
-            <a:schemeClr val="accent1"/>
-          </a:effectRef>
-          <a:fontRef idx="minor">
-            <a:schemeClr val="lt1"/>
-          </a:fontRef>
-        </p:style>
-        <p:txBody>
-          <a:bodyPr rtlCol="0" anchor="ctr"/>
-          <a:lstStyle/>
-          <a:p>
-            <a:pPr algn="ctr"/>
-            <a:endParaRPr lang="hu-HU"/>
-          </a:p>
-        </p:txBody>
-      </p:sp>
-      <p:sp>
-        <p:nvSpPr>
-          <p:cNvPr id="5" name="Téglalap 4">
-            <a:extLst>
-              <a:ext uri="{FF2B5EF4-FFF2-40B4-BE49-F238E27FC236}">
-                <a16:creationId xmlns:a16="http://schemas.microsoft.com/office/drawing/2014/main" id="{DA2DDC5E-7022-9E6C-C838-ADCE9D1414AE}"/>
-              </a:ext>
-            </a:extLst>
-          </p:cNvPr>
-          <p:cNvSpPr/>
-          <p:nvPr/>
-        </p:nvSpPr>
-        <p:spPr>
-          <a:xfrm>
-            <a:off x="1749551" y="788408"/>
-            <a:ext cx="2182369" cy="5900428"/>
-          </a:xfrm>
-          <a:prstGeom prst="rect">
-            <a:avLst/>
-          </a:prstGeom>
-          <a:solidFill>
-            <a:schemeClr val="bg2">
-              <a:lumMod val="25000"/>
-            </a:schemeClr>
-          </a:solidFill>
-          <a:ln>
-            <a:solidFill>
-              <a:schemeClr val="tx1">
-                <a:lumMod val="65000"/>
-                <a:lumOff val="35000"/>
-              </a:schemeClr>
-            </a:solidFill>
-          </a:ln>
-        </p:spPr>
-        <p:style>
-          <a:lnRef idx="2">
-            <a:schemeClr val="accent1">
-              <a:shade val="15000"/>
-            </a:schemeClr>
-          </a:lnRef>
-          <a:fillRef idx="1">
-            <a:schemeClr val="accent1"/>
-          </a:fillRef>
-          <a:effectRef idx="0">
-            <a:schemeClr val="accent1"/>
-          </a:effectRef>
-          <a:fontRef idx="minor">
-            <a:schemeClr val="lt1"/>
-          </a:fontRef>
-        </p:style>
-        <p:txBody>
-          <a:bodyPr rtlCol="0" anchor="ctr"/>
-          <a:lstStyle/>
-          <a:p>
-            <a:pPr algn="ctr"/>
-            <a:endParaRPr lang="hu-HU" dirty="0"/>
-          </a:p>
-        </p:txBody>
-      </p:sp>
-      <p:sp>
-        <p:nvSpPr>
-          <p:cNvPr id="6" name="Téglalap 5">
-            <a:extLst>
-              <a:ext uri="{FF2B5EF4-FFF2-40B4-BE49-F238E27FC236}">
-                <a16:creationId xmlns:a16="http://schemas.microsoft.com/office/drawing/2014/main" id="{2BCB59C4-FD78-3B6C-8904-2A69E3FF17C4}"/>
-              </a:ext>
-            </a:extLst>
-          </p:cNvPr>
-          <p:cNvSpPr/>
-          <p:nvPr/>
-        </p:nvSpPr>
-        <p:spPr>
-          <a:xfrm>
-            <a:off x="3931920" y="788408"/>
-            <a:ext cx="2295144" cy="5900428"/>
-          </a:xfrm>
-          <a:prstGeom prst="rect">
-            <a:avLst/>
-          </a:prstGeom>
-          <a:solidFill>
-            <a:srgbClr val="181F24"/>
-          </a:solidFill>
-          <a:ln>
-            <a:solidFill>
-              <a:schemeClr val="tx1"/>
-            </a:solidFill>
-          </a:ln>
-        </p:spPr>
-        <p:style>
-          <a:lnRef idx="2">
-            <a:schemeClr val="accent1">
-              <a:shade val="15000"/>
-            </a:schemeClr>
-          </a:lnRef>
-          <a:fillRef idx="1">
-            <a:schemeClr val="accent1"/>
-          </a:fillRef>
-          <a:effectRef idx="0">
-            <a:schemeClr val="accent1"/>
-          </a:effectRef>
-          <a:fontRef idx="minor">
-            <a:schemeClr val="lt1"/>
-          </a:fontRef>
-        </p:style>
-        <p:txBody>
-          <a:bodyPr rtlCol="0" anchor="ctr"/>
-          <a:lstStyle/>
-          <a:p>
-            <a:pPr algn="ctr"/>
-            <a:endParaRPr lang="hu-HU"/>
-          </a:p>
-        </p:txBody>
-      </p:sp>
-      <p:sp>
-        <p:nvSpPr>
-          <p:cNvPr id="7" name="Téglalap 6">
-            <a:extLst>
-              <a:ext uri="{FF2B5EF4-FFF2-40B4-BE49-F238E27FC236}">
-                <a16:creationId xmlns:a16="http://schemas.microsoft.com/office/drawing/2014/main" id="{6C9B83E0-6DC8-EAC1-B826-768D5EF6F301}"/>
-              </a:ext>
-            </a:extLst>
-          </p:cNvPr>
-          <p:cNvSpPr/>
-          <p:nvPr/>
-        </p:nvSpPr>
-        <p:spPr>
-          <a:xfrm>
-            <a:off x="6227064" y="788408"/>
-            <a:ext cx="4215385" cy="5900428"/>
-          </a:xfrm>
-          <a:prstGeom prst="rect">
-            <a:avLst/>
-          </a:prstGeom>
-          <a:solidFill>
-            <a:schemeClr val="tx1">
-              <a:lumMod val="85000"/>
-              <a:lumOff val="15000"/>
-            </a:schemeClr>
-          </a:solidFill>
-          <a:ln>
-            <a:solidFill>
-              <a:schemeClr val="tx1"/>
-            </a:solidFill>
-          </a:ln>
-        </p:spPr>
-        <p:style>
-          <a:lnRef idx="2">
-            <a:schemeClr val="accent1">
-              <a:shade val="15000"/>
-            </a:schemeClr>
-          </a:lnRef>
-          <a:fillRef idx="1">
-            <a:schemeClr val="accent1"/>
-          </a:fillRef>
-          <a:effectRef idx="0">
-            <a:schemeClr val="accent1"/>
-          </a:effectRef>
-          <a:fontRef idx="minor">
-            <a:schemeClr val="lt1"/>
-          </a:fontRef>
-        </p:style>
-        <p:txBody>
-          <a:bodyPr rtlCol="0" anchor="ctr"/>
-          <a:lstStyle/>
-          <a:p>
-            <a:pPr algn="ctr"/>
-            <a:endParaRPr lang="hu-HU"/>
-          </a:p>
-        </p:txBody>
-      </p:sp>
-      <p:sp>
-        <p:nvSpPr>
-          <p:cNvPr id="9" name="Téglalap 8">
-            <a:extLst>
-              <a:ext uri="{FF2B5EF4-FFF2-40B4-BE49-F238E27FC236}">
-                <a16:creationId xmlns:a16="http://schemas.microsoft.com/office/drawing/2014/main" id="{8080EEB1-3508-DA23-822D-780D88F13086}"/>
-              </a:ext>
-            </a:extLst>
-          </p:cNvPr>
-          <p:cNvSpPr/>
-          <p:nvPr/>
-        </p:nvSpPr>
-        <p:spPr>
-          <a:xfrm>
-            <a:off x="1749551" y="0"/>
-            <a:ext cx="8692898" cy="169164"/>
+            <a:off x="4247535" y="639097"/>
+            <a:ext cx="3156746" cy="169164"/>
           </a:xfrm>
           <a:prstGeom prst="rect">
             <a:avLst/>
@@ -3597,10 +3381,10 @@
       </p:sp>
       <p:sp>
         <p:nvSpPr>
-          <p:cNvPr id="10" name="Téglalap 9">
-            <a:extLst>
-              <a:ext uri="{FF2B5EF4-FFF2-40B4-BE49-F238E27FC236}">
-                <a16:creationId xmlns:a16="http://schemas.microsoft.com/office/drawing/2014/main" id="{C8DDB6D0-DD1A-B80E-62AB-48EF386DF3C5}"/>
+          <p:cNvPr id="5" name="Téglalap 4">
+            <a:extLst>
+              <a:ext uri="{FF2B5EF4-FFF2-40B4-BE49-F238E27FC236}">
+                <a16:creationId xmlns:a16="http://schemas.microsoft.com/office/drawing/2014/main" id="{29B3DE1A-0F83-D9F2-C6A8-2413D24FF94D}"/>
               </a:ext>
             </a:extLst>
           </p:cNvPr>
@@ -3609,7 +3393,7 @@
         </p:nvSpPr>
         <p:spPr>
           <a:xfrm>
-            <a:off x="10153650" y="0"/>
+            <a:off x="7115482" y="639097"/>
             <a:ext cx="288799" cy="169164"/>
           </a:xfrm>
           <a:prstGeom prst="rect">
@@ -3652,10 +3436,10 @@
       </p:sp>
       <p:sp>
         <p:nvSpPr>
-          <p:cNvPr id="11" name="Téglalap 10">
-            <a:extLst>
-              <a:ext uri="{FF2B5EF4-FFF2-40B4-BE49-F238E27FC236}">
-                <a16:creationId xmlns:a16="http://schemas.microsoft.com/office/drawing/2014/main" id="{9C00880D-EBAE-51DF-D511-12995B5F7C15}"/>
+          <p:cNvPr id="6" name="Téglalap 5">
+            <a:extLst>
+              <a:ext uri="{FF2B5EF4-FFF2-40B4-BE49-F238E27FC236}">
+                <a16:creationId xmlns:a16="http://schemas.microsoft.com/office/drawing/2014/main" id="{9CAE3CDA-9486-5F36-61C8-0970B6AB4B6A}"/>
               </a:ext>
             </a:extLst>
           </p:cNvPr>
@@ -3664,7 +3448,7 @@
         </p:nvSpPr>
         <p:spPr>
           <a:xfrm>
-            <a:off x="9864851" y="0"/>
+            <a:off x="6826683" y="639097"/>
             <a:ext cx="288799" cy="169164"/>
           </a:xfrm>
           <a:prstGeom prst="rect">
@@ -3715,10 +3499,10 @@
       </p:sp>
       <p:sp>
         <p:nvSpPr>
-          <p:cNvPr id="12" name="Téglalap 11">
-            <a:extLst>
-              <a:ext uri="{FF2B5EF4-FFF2-40B4-BE49-F238E27FC236}">
-                <a16:creationId xmlns:a16="http://schemas.microsoft.com/office/drawing/2014/main" id="{70251261-4E5B-BEBB-8685-8FD168CE355F}"/>
+          <p:cNvPr id="7" name="Téglalap 6">
+            <a:extLst>
+              <a:ext uri="{FF2B5EF4-FFF2-40B4-BE49-F238E27FC236}">
+                <a16:creationId xmlns:a16="http://schemas.microsoft.com/office/drawing/2014/main" id="{17BDD51C-922C-8AEC-EE58-ABD7D0C7C8DF}"/>
               </a:ext>
             </a:extLst>
           </p:cNvPr>
@@ -3727,7 +3511,7 @@
         </p:nvSpPr>
         <p:spPr>
           <a:xfrm>
-            <a:off x="9576052" y="0"/>
+            <a:off x="6537884" y="639097"/>
             <a:ext cx="288799" cy="169164"/>
           </a:xfrm>
           <a:prstGeom prst="rect">
@@ -3773,237 +3557,62 @@
       </p:sp>
       <p:sp>
         <p:nvSpPr>
-          <p:cNvPr id="14" name="Szövegdoboz 13">
-            <a:extLst>
-              <a:ext uri="{FF2B5EF4-FFF2-40B4-BE49-F238E27FC236}">
-                <a16:creationId xmlns:a16="http://schemas.microsoft.com/office/drawing/2014/main" id="{934387DE-0D49-BF55-36A7-1A2D99EB59EB}"/>
-              </a:ext>
-            </a:extLst>
-          </p:cNvPr>
-          <p:cNvSpPr txBox="1"/>
+          <p:cNvPr id="8" name="Téglalap 7">
+            <a:extLst>
+              <a:ext uri="{FF2B5EF4-FFF2-40B4-BE49-F238E27FC236}">
+                <a16:creationId xmlns:a16="http://schemas.microsoft.com/office/drawing/2014/main" id="{B6503C81-D976-5BFC-2397-9E639C49A939}"/>
+              </a:ext>
+            </a:extLst>
+          </p:cNvPr>
+          <p:cNvSpPr/>
           <p:nvPr/>
         </p:nvSpPr>
         <p:spPr>
           <a:xfrm>
-            <a:off x="1819083" y="782312"/>
-            <a:ext cx="2027879" cy="3170099"/>
+            <a:off x="4247535" y="808261"/>
+            <a:ext cx="3156746" cy="3333433"/>
           </a:xfrm>
           <a:prstGeom prst="rect">
             <a:avLst/>
           </a:prstGeom>
-          <a:noFill/>
-        </p:spPr>
-        <p:txBody>
-          <a:bodyPr wrap="square" rtlCol="0">
-            <a:spAutoFit/>
-          </a:bodyPr>
-          <a:lstStyle/>
-          <a:p>
-            <a:r>
-              <a:rPr lang="hu-HU" dirty="0">
-                <a:solidFill>
-                  <a:schemeClr val="bg1"/>
-                </a:solidFill>
-              </a:rPr>
-              <a:t>Minden bejegyzés</a:t>
-            </a:r>
-          </a:p>
-          <a:p>
-            <a:r>
-              <a:rPr lang="hu-HU" dirty="0">
-                <a:solidFill>
-                  <a:schemeClr val="bg1"/>
-                </a:solidFill>
-              </a:rPr>
-              <a:t>Kategóriák</a:t>
-            </a:r>
-          </a:p>
-          <a:p>
-            <a:r>
-              <a:rPr lang="hu-HU" dirty="0">
-                <a:solidFill>
-                  <a:schemeClr val="bg1"/>
-                </a:solidFill>
-              </a:rPr>
-              <a:t>   </a:t>
-            </a:r>
-            <a:r>
-              <a:rPr lang="hu-HU" sz="1600" dirty="0">
-                <a:solidFill>
-                  <a:schemeClr val="bg1"/>
-                </a:solidFill>
-              </a:rPr>
-              <a:t>Jelszavak</a:t>
-            </a:r>
-          </a:p>
-          <a:p>
-            <a:r>
-              <a:rPr lang="hu-HU" sz="1600" dirty="0">
-                <a:solidFill>
-                  <a:schemeClr val="bg1"/>
-                </a:solidFill>
-              </a:rPr>
-              <a:t>   Bankkártyák</a:t>
-            </a:r>
-          </a:p>
-          <a:p>
-            <a:r>
-              <a:rPr lang="hu-HU" sz="1600" dirty="0">
-                <a:solidFill>
-                  <a:schemeClr val="bg1"/>
-                </a:solidFill>
-              </a:rPr>
-              <a:t>   Jegyzetek</a:t>
-            </a:r>
-          </a:p>
-          <a:p>
-            <a:r>
-              <a:rPr lang="hu-HU" sz="1600" dirty="0">
-                <a:solidFill>
-                  <a:schemeClr val="bg1"/>
-                </a:solidFill>
-              </a:rPr>
-              <a:t>   Kártyák</a:t>
-            </a:r>
-          </a:p>
-          <a:p>
-            <a:r>
-              <a:rPr lang="hu-HU" sz="1600" dirty="0">
-                <a:solidFill>
-                  <a:schemeClr val="bg1"/>
-                </a:solidFill>
-              </a:rPr>
-              <a:t>   Email</a:t>
-            </a:r>
-          </a:p>
-          <a:p>
-            <a:endParaRPr lang="hu-HU" sz="1600" dirty="0">
-              <a:solidFill>
-                <a:schemeClr val="bg1"/>
-              </a:solidFill>
-            </a:endParaRPr>
-          </a:p>
-          <a:p>
-            <a:endParaRPr lang="hu-HU" sz="1600" dirty="0">
-              <a:solidFill>
-                <a:schemeClr val="bg1"/>
-              </a:solidFill>
-            </a:endParaRPr>
-          </a:p>
-          <a:p>
-            <a:endParaRPr lang="hu-HU" sz="1600" dirty="0">
-              <a:solidFill>
-                <a:schemeClr val="bg1"/>
-              </a:solidFill>
-            </a:endParaRPr>
-          </a:p>
-          <a:p>
-            <a:endParaRPr lang="hu-HU" sz="1600" dirty="0">
-              <a:solidFill>
-                <a:schemeClr val="bg1"/>
-              </a:solidFill>
-            </a:endParaRPr>
-          </a:p>
-          <a:p>
-            <a:r>
-              <a:rPr lang="hu-HU" dirty="0">
-                <a:solidFill>
-                  <a:schemeClr val="bg1"/>
-                </a:solidFill>
-              </a:rPr>
-              <a:t>Beállítások</a:t>
-            </a:r>
-            <a:endParaRPr lang="hu-HU" sz="1600" dirty="0">
-              <a:solidFill>
-                <a:schemeClr val="bg1"/>
-              </a:solidFill>
-            </a:endParaRPr>
-          </a:p>
-        </p:txBody>
-      </p:sp>
-      <p:cxnSp>
-        <p:nvCxnSpPr>
-          <p:cNvPr id="16" name="Egyenes összekötő 15">
-            <a:extLst>
-              <a:ext uri="{FF2B5EF4-FFF2-40B4-BE49-F238E27FC236}">
-                <a16:creationId xmlns:a16="http://schemas.microsoft.com/office/drawing/2014/main" id="{C304AF26-63D6-F62E-95D7-492C2741964A}"/>
-              </a:ext>
-            </a:extLst>
-          </p:cNvPr>
-          <p:cNvCxnSpPr>
-            <a:cxnSpLocks/>
-          </p:cNvCxnSpPr>
-          <p:nvPr/>
-        </p:nvCxnSpPr>
-        <p:spPr>
-          <a:xfrm>
-            <a:off x="1906904" y="1371100"/>
-            <a:ext cx="1455040" cy="0"/>
-          </a:xfrm>
-          <a:prstGeom prst="line">
-            <a:avLst/>
-          </a:prstGeom>
+          <a:solidFill>
+            <a:srgbClr val="181F24"/>
+          </a:solidFill>
+          <a:ln>
+            <a:noFill/>
+          </a:ln>
         </p:spPr>
         <p:style>
           <a:lnRef idx="2">
-            <a:schemeClr val="accent1"/>
+            <a:schemeClr val="accent1">
+              <a:shade val="15000"/>
+            </a:schemeClr>
           </a:lnRef>
-          <a:fillRef idx="0">
+          <a:fillRef idx="1">
             <a:schemeClr val="accent1"/>
           </a:fillRef>
-          <a:effectRef idx="1">
+          <a:effectRef idx="0">
             <a:schemeClr val="accent1"/>
           </a:effectRef>
           <a:fontRef idx="minor">
-            <a:schemeClr val="tx1"/>
+            <a:schemeClr val="lt1"/>
           </a:fontRef>
         </p:style>
-      </p:cxnSp>
-      <p:sp>
-        <p:nvSpPr>
-          <p:cNvPr id="19" name="Szövegdoboz 18">
-            <a:extLst>
-              <a:ext uri="{FF2B5EF4-FFF2-40B4-BE49-F238E27FC236}">
-                <a16:creationId xmlns:a16="http://schemas.microsoft.com/office/drawing/2014/main" id="{B50487E9-EB8C-0F98-A2C4-7F7804145B93}"/>
-              </a:ext>
-            </a:extLst>
-          </p:cNvPr>
-          <p:cNvSpPr txBox="1"/>
-          <p:nvPr/>
-        </p:nvSpPr>
-        <p:spPr>
-          <a:xfrm>
-            <a:off x="3931919" y="793051"/>
-            <a:ext cx="2498026" cy="369332"/>
-          </a:xfrm>
-          <a:prstGeom prst="rect">
-            <a:avLst/>
-          </a:prstGeom>
-          <a:noFill/>
-        </p:spPr>
-        <p:txBody>
-          <a:bodyPr wrap="square" rtlCol="0">
-            <a:spAutoFit/>
-          </a:bodyPr>
-          <a:lstStyle/>
-          <a:p>
-            <a:r>
-              <a:rPr lang="hu-HU" b="1" dirty="0">
-                <a:solidFill>
-                  <a:schemeClr val="bg1"/>
-                </a:solidFill>
-              </a:rPr>
-              <a:t>Minden bejegyzés</a:t>
-            </a:r>
-          </a:p>
-        </p:txBody>
-      </p:sp>
-      <p:sp>
-        <p:nvSpPr>
-          <p:cNvPr id="21" name="Téglalap 20">
-            <a:extLst>
-              <a:ext uri="{FF2B5EF4-FFF2-40B4-BE49-F238E27FC236}">
-                <a16:creationId xmlns:a16="http://schemas.microsoft.com/office/drawing/2014/main" id="{0F2F24FB-17A0-7341-8DE1-D80FB9E4069F}"/>
+        <p:txBody>
+          <a:bodyPr rtlCol="0" anchor="ctr"/>
+          <a:lstStyle/>
+          <a:p>
+            <a:pPr algn="ctr"/>
+            <a:endParaRPr lang="hu-HU"/>
+          </a:p>
+        </p:txBody>
+      </p:sp>
+      <p:sp>
+        <p:nvSpPr>
+          <p:cNvPr id="9" name="Téglalap 8">
+            <a:extLst>
+              <a:ext uri="{FF2B5EF4-FFF2-40B4-BE49-F238E27FC236}">
+                <a16:creationId xmlns:a16="http://schemas.microsoft.com/office/drawing/2014/main" id="{A81DB47A-8C7F-0CFC-808B-0D1E674DDF15}"/>
               </a:ext>
             </a:extLst>
           </p:cNvPr>
@@ -4012,8 +3621,8 @@
         </p:nvSpPr>
         <p:spPr>
           <a:xfrm>
-            <a:off x="1749551" y="169164"/>
-            <a:ext cx="8692898" cy="619244"/>
+            <a:off x="4247535" y="810606"/>
+            <a:ext cx="3156746" cy="619244"/>
           </a:xfrm>
           <a:prstGeom prst="rect">
             <a:avLst/>
@@ -4022,9 +3631,7 @@
             <a:srgbClr val="0A0064"/>
           </a:solidFill>
           <a:ln>
-            <a:solidFill>
-              <a:srgbClr val="010237"/>
-            </a:solidFill>
+            <a:noFill/>
           </a:ln>
         </p:spPr>
         <p:style>
@@ -4054,10 +3661,10 @@
       </p:sp>
       <p:sp>
         <p:nvSpPr>
-          <p:cNvPr id="22" name="Szövegdoboz 21">
-            <a:extLst>
-              <a:ext uri="{FF2B5EF4-FFF2-40B4-BE49-F238E27FC236}">
-                <a16:creationId xmlns:a16="http://schemas.microsoft.com/office/drawing/2014/main" id="{C2AF8786-1F55-A491-D073-CE5AE6B72722}"/>
+          <p:cNvPr id="10" name="Szövegdoboz 9">
+            <a:extLst>
+              <a:ext uri="{FF2B5EF4-FFF2-40B4-BE49-F238E27FC236}">
+                <a16:creationId xmlns:a16="http://schemas.microsoft.com/office/drawing/2014/main" id="{CF22D411-D48F-1464-F85F-DE703D8B8B38}"/>
               </a:ext>
             </a:extLst>
           </p:cNvPr>
@@ -4066,13 +3673,1236 @@
         </p:nvSpPr>
         <p:spPr>
           <a:xfrm>
-            <a:off x="4454303" y="296967"/>
-            <a:ext cx="1542860" cy="338554"/>
+            <a:off x="4601816" y="889395"/>
+            <a:ext cx="2448184" cy="461665"/>
           </a:xfrm>
           <a:prstGeom prst="rect">
             <a:avLst/>
           </a:prstGeom>
           <a:noFill/>
+          <a:ln>
+            <a:noFill/>
+          </a:ln>
+        </p:spPr>
+        <p:txBody>
+          <a:bodyPr wrap="square" rtlCol="0">
+            <a:spAutoFit/>
+          </a:bodyPr>
+          <a:lstStyle/>
+          <a:p>
+            <a:pPr algn="ctr"/>
+            <a:r>
+              <a:rPr lang="hu-HU" sz="2400" dirty="0" err="1">
+                <a:solidFill>
+                  <a:schemeClr val="bg1"/>
+                </a:solidFill>
+                <a:latin typeface="Impact" panose="020B0806030902050204" pitchFamily="34" charset="0"/>
+                <a:cs typeface="Aharoni" panose="02010803020104030203" pitchFamily="2" charset="-79"/>
+              </a:rPr>
+              <a:t>Vault</a:t>
+            </a:r>
+            <a:r>
+              <a:rPr lang="hu-HU" sz="2400" dirty="0">
+                <a:solidFill>
+                  <a:schemeClr val="bg1"/>
+                </a:solidFill>
+                <a:latin typeface="Impact" panose="020B0806030902050204" pitchFamily="34" charset="0"/>
+                <a:cs typeface="Aharoni" panose="02010803020104030203" pitchFamily="2" charset="-79"/>
+              </a:rPr>
+              <a:t> </a:t>
+            </a:r>
+            <a:r>
+              <a:rPr lang="hu-HU" sz="2400" dirty="0" err="1">
+                <a:solidFill>
+                  <a:schemeClr val="bg1"/>
+                </a:solidFill>
+                <a:latin typeface="Impact" panose="020B0806030902050204" pitchFamily="34" charset="0"/>
+                <a:cs typeface="Aharoni" panose="02010803020104030203" pitchFamily="2" charset="-79"/>
+              </a:rPr>
+              <a:t>Vader</a:t>
+            </a:r>
+            <a:endParaRPr lang="hu-HU" sz="2400" dirty="0">
+              <a:solidFill>
+                <a:schemeClr val="bg1"/>
+              </a:solidFill>
+              <a:latin typeface="Impact" panose="020B0806030902050204" pitchFamily="34" charset="0"/>
+              <a:cs typeface="Aharoni" panose="02010803020104030203" pitchFamily="2" charset="-79"/>
+            </a:endParaRPr>
+          </a:p>
+        </p:txBody>
+      </p:sp>
+      <p:sp>
+        <p:nvSpPr>
+          <p:cNvPr id="11" name="Téglalap 10">
+            <a:extLst>
+              <a:ext uri="{FF2B5EF4-FFF2-40B4-BE49-F238E27FC236}">
+                <a16:creationId xmlns:a16="http://schemas.microsoft.com/office/drawing/2014/main" id="{28B8E58C-1595-8258-8346-91538893E675}"/>
+              </a:ext>
+            </a:extLst>
+          </p:cNvPr>
+          <p:cNvSpPr/>
+          <p:nvPr/>
+        </p:nvSpPr>
+        <p:spPr>
+          <a:xfrm>
+            <a:off x="4655349" y="1796463"/>
+            <a:ext cx="2341118" cy="367720"/>
+          </a:xfrm>
+          <a:prstGeom prst="rect">
+            <a:avLst/>
+          </a:prstGeom>
+          <a:noFill/>
+          <a:ln>
+            <a:noFill/>
+          </a:ln>
+        </p:spPr>
+        <p:style>
+          <a:lnRef idx="2">
+            <a:schemeClr val="accent1">
+              <a:shade val="15000"/>
+            </a:schemeClr>
+          </a:lnRef>
+          <a:fillRef idx="1">
+            <a:schemeClr val="accent1"/>
+          </a:fillRef>
+          <a:effectRef idx="0">
+            <a:schemeClr val="accent1"/>
+          </a:effectRef>
+          <a:fontRef idx="minor">
+            <a:schemeClr val="lt1"/>
+          </a:fontRef>
+        </p:style>
+        <p:txBody>
+          <a:bodyPr rtlCol="0" anchor="ctr"/>
+          <a:lstStyle/>
+          <a:p>
+            <a:pPr algn="ctr"/>
+            <a:r>
+              <a:rPr lang="hu-HU" dirty="0"/>
+              <a:t>Felhasználónév</a:t>
+            </a:r>
+          </a:p>
+        </p:txBody>
+      </p:sp>
+      <p:sp>
+        <p:nvSpPr>
+          <p:cNvPr id="12" name="Téglalap 11">
+            <a:extLst>
+              <a:ext uri="{FF2B5EF4-FFF2-40B4-BE49-F238E27FC236}">
+                <a16:creationId xmlns:a16="http://schemas.microsoft.com/office/drawing/2014/main" id="{23947FF2-10AE-BC5D-3344-16BD96E6FF02}"/>
+              </a:ext>
+            </a:extLst>
+          </p:cNvPr>
+          <p:cNvSpPr/>
+          <p:nvPr/>
+        </p:nvSpPr>
+        <p:spPr>
+          <a:xfrm>
+            <a:off x="4655349" y="2356092"/>
+            <a:ext cx="2341118" cy="367720"/>
+          </a:xfrm>
+          <a:prstGeom prst="rect">
+            <a:avLst/>
+          </a:prstGeom>
+          <a:noFill/>
+          <a:ln>
+            <a:noFill/>
+          </a:ln>
+        </p:spPr>
+        <p:style>
+          <a:lnRef idx="2">
+            <a:schemeClr val="accent1">
+              <a:shade val="15000"/>
+            </a:schemeClr>
+          </a:lnRef>
+          <a:fillRef idx="1">
+            <a:schemeClr val="accent1"/>
+          </a:fillRef>
+          <a:effectRef idx="0">
+            <a:schemeClr val="accent1"/>
+          </a:effectRef>
+          <a:fontRef idx="minor">
+            <a:schemeClr val="lt1"/>
+          </a:fontRef>
+        </p:style>
+        <p:txBody>
+          <a:bodyPr rtlCol="0" anchor="ctr"/>
+          <a:lstStyle/>
+          <a:p>
+            <a:pPr algn="ctr"/>
+            <a:r>
+              <a:rPr lang="hu-HU" dirty="0"/>
+              <a:t>Jelszó</a:t>
+            </a:r>
+          </a:p>
+        </p:txBody>
+      </p:sp>
+      <p:sp>
+        <p:nvSpPr>
+          <p:cNvPr id="13" name="Téglalap: lekerekített 12">
+            <a:extLst>
+              <a:ext uri="{FF2B5EF4-FFF2-40B4-BE49-F238E27FC236}">
+                <a16:creationId xmlns:a16="http://schemas.microsoft.com/office/drawing/2014/main" id="{A712D04F-05D9-7F61-B408-024DFC8DD06D}"/>
+              </a:ext>
+            </a:extLst>
+          </p:cNvPr>
+          <p:cNvSpPr/>
+          <p:nvPr/>
+        </p:nvSpPr>
+        <p:spPr>
+          <a:xfrm>
+            <a:off x="5021999" y="3133889"/>
+            <a:ext cx="1607819" cy="409575"/>
+          </a:xfrm>
+          <a:prstGeom prst="roundRect">
+            <a:avLst/>
+          </a:prstGeom>
+          <a:solidFill>
+            <a:schemeClr val="accent1">
+              <a:lumMod val="60000"/>
+              <a:lumOff val="40000"/>
+            </a:schemeClr>
+          </a:solidFill>
+          <a:ln>
+            <a:noFill/>
+          </a:ln>
+        </p:spPr>
+        <p:style>
+          <a:lnRef idx="2">
+            <a:schemeClr val="accent1">
+              <a:shade val="15000"/>
+            </a:schemeClr>
+          </a:lnRef>
+          <a:fillRef idx="1">
+            <a:schemeClr val="accent1"/>
+          </a:fillRef>
+          <a:effectRef idx="0">
+            <a:schemeClr val="accent1"/>
+          </a:effectRef>
+          <a:fontRef idx="minor">
+            <a:schemeClr val="lt1"/>
+          </a:fontRef>
+        </p:style>
+        <p:txBody>
+          <a:bodyPr rtlCol="0" anchor="ctr"/>
+          <a:lstStyle/>
+          <a:p>
+            <a:pPr algn="ctr"/>
+            <a:r>
+              <a:rPr lang="hu-HU" dirty="0"/>
+              <a:t>Bejelentkezés</a:t>
+            </a:r>
+          </a:p>
+        </p:txBody>
+      </p:sp>
+      <p:sp>
+        <p:nvSpPr>
+          <p:cNvPr id="14" name="Szövegdoboz 13">
+            <a:extLst>
+              <a:ext uri="{FF2B5EF4-FFF2-40B4-BE49-F238E27FC236}">
+                <a16:creationId xmlns:a16="http://schemas.microsoft.com/office/drawing/2014/main" id="{B8C1DEFA-66D9-E3F9-A3CE-F04B082CE9CE}"/>
+              </a:ext>
+            </a:extLst>
+          </p:cNvPr>
+          <p:cNvSpPr txBox="1"/>
+          <p:nvPr/>
+        </p:nvSpPr>
+        <p:spPr>
+          <a:xfrm>
+            <a:off x="4968065" y="2769528"/>
+            <a:ext cx="1715686" cy="261610"/>
+          </a:xfrm>
+          <a:prstGeom prst="rect">
+            <a:avLst/>
+          </a:prstGeom>
+          <a:noFill/>
+        </p:spPr>
+        <p:txBody>
+          <a:bodyPr wrap="square" rtlCol="0">
+            <a:spAutoFit/>
+          </a:bodyPr>
+          <a:lstStyle/>
+          <a:p>
+            <a:pPr algn="ctr"/>
+            <a:r>
+              <a:rPr lang="hu-HU" sz="1100" u="sng" dirty="0">
+                <a:solidFill>
+                  <a:schemeClr val="accent1">
+                    <a:lumMod val="20000"/>
+                    <a:lumOff val="80000"/>
+                  </a:schemeClr>
+                </a:solidFill>
+              </a:rPr>
+              <a:t>Elfelejtett jelszó</a:t>
+            </a:r>
+          </a:p>
+        </p:txBody>
+      </p:sp>
+      <p:sp>
+        <p:nvSpPr>
+          <p:cNvPr id="15" name="Téglalap: lekerekített 14">
+            <a:extLst>
+              <a:ext uri="{FF2B5EF4-FFF2-40B4-BE49-F238E27FC236}">
+                <a16:creationId xmlns:a16="http://schemas.microsoft.com/office/drawing/2014/main" id="{BFEE7318-D704-D3AF-462A-132362423EF7}"/>
+              </a:ext>
+            </a:extLst>
+          </p:cNvPr>
+          <p:cNvSpPr/>
+          <p:nvPr/>
+        </p:nvSpPr>
+        <p:spPr>
+          <a:xfrm>
+            <a:off x="5021999" y="3535645"/>
+            <a:ext cx="1607819" cy="409575"/>
+          </a:xfrm>
+          <a:prstGeom prst="roundRect">
+            <a:avLst/>
+          </a:prstGeom>
+          <a:noFill/>
+          <a:ln>
+            <a:noFill/>
+          </a:ln>
+        </p:spPr>
+        <p:style>
+          <a:lnRef idx="2">
+            <a:schemeClr val="accent1">
+              <a:shade val="15000"/>
+            </a:schemeClr>
+          </a:lnRef>
+          <a:fillRef idx="1">
+            <a:schemeClr val="accent1"/>
+          </a:fillRef>
+          <a:effectRef idx="0">
+            <a:schemeClr val="accent1"/>
+          </a:effectRef>
+          <a:fontRef idx="minor">
+            <a:schemeClr val="lt1"/>
+          </a:fontRef>
+        </p:style>
+        <p:txBody>
+          <a:bodyPr rtlCol="0" anchor="ctr"/>
+          <a:lstStyle/>
+          <a:p>
+            <a:pPr algn="ctr"/>
+            <a:r>
+              <a:rPr lang="hu-HU" sz="1600" dirty="0">
+                <a:solidFill>
+                  <a:schemeClr val="tx2">
+                    <a:lumMod val="50000"/>
+                    <a:lumOff val="50000"/>
+                  </a:schemeClr>
+                </a:solidFill>
+              </a:rPr>
+              <a:t>Regisztráció</a:t>
+            </a:r>
+          </a:p>
+        </p:txBody>
+      </p:sp>
+      <p:cxnSp>
+        <p:nvCxnSpPr>
+          <p:cNvPr id="17" name="Egyenes összekötő 16">
+            <a:extLst>
+              <a:ext uri="{FF2B5EF4-FFF2-40B4-BE49-F238E27FC236}">
+                <a16:creationId xmlns:a16="http://schemas.microsoft.com/office/drawing/2014/main" id="{56456DE6-D279-7F02-2B9D-C0E87C2E7371}"/>
+              </a:ext>
+            </a:extLst>
+          </p:cNvPr>
+          <p:cNvCxnSpPr/>
+          <p:nvPr/>
+        </p:nvCxnSpPr>
+        <p:spPr>
+          <a:xfrm>
+            <a:off x="4247535" y="1429850"/>
+            <a:ext cx="3156746" cy="0"/>
+          </a:xfrm>
+          <a:prstGeom prst="line">
+            <a:avLst/>
+          </a:prstGeom>
+          <a:ln>
+            <a:solidFill>
+              <a:schemeClr val="bg1"/>
+            </a:solidFill>
+          </a:ln>
+        </p:spPr>
+        <p:style>
+          <a:lnRef idx="2">
+            <a:schemeClr val="accent1"/>
+          </a:lnRef>
+          <a:fillRef idx="0">
+            <a:schemeClr val="accent1"/>
+          </a:fillRef>
+          <a:effectRef idx="1">
+            <a:schemeClr val="accent1"/>
+          </a:effectRef>
+          <a:fontRef idx="minor">
+            <a:schemeClr val="tx1"/>
+          </a:fontRef>
+        </p:style>
+      </p:cxnSp>
+      <p:cxnSp>
+        <p:nvCxnSpPr>
+          <p:cNvPr id="18" name="Egyenes összekötő 17">
+            <a:extLst>
+              <a:ext uri="{FF2B5EF4-FFF2-40B4-BE49-F238E27FC236}">
+                <a16:creationId xmlns:a16="http://schemas.microsoft.com/office/drawing/2014/main" id="{2E623D28-B8F8-A997-673A-3652B0648539}"/>
+              </a:ext>
+            </a:extLst>
+          </p:cNvPr>
+          <p:cNvCxnSpPr>
+            <a:cxnSpLocks/>
+          </p:cNvCxnSpPr>
+          <p:nvPr/>
+        </p:nvCxnSpPr>
+        <p:spPr>
+          <a:xfrm>
+            <a:off x="4655349" y="2161167"/>
+            <a:ext cx="2341118" cy="0"/>
+          </a:xfrm>
+          <a:prstGeom prst="line">
+            <a:avLst/>
+          </a:prstGeom>
+          <a:ln>
+            <a:solidFill>
+              <a:schemeClr val="bg1"/>
+            </a:solidFill>
+          </a:ln>
+        </p:spPr>
+        <p:style>
+          <a:lnRef idx="2">
+            <a:schemeClr val="accent1"/>
+          </a:lnRef>
+          <a:fillRef idx="0">
+            <a:schemeClr val="accent1"/>
+          </a:fillRef>
+          <a:effectRef idx="1">
+            <a:schemeClr val="accent1"/>
+          </a:effectRef>
+          <a:fontRef idx="minor">
+            <a:schemeClr val="tx1"/>
+          </a:fontRef>
+        </p:style>
+      </p:cxnSp>
+      <p:cxnSp>
+        <p:nvCxnSpPr>
+          <p:cNvPr id="21" name="Egyenes összekötő 20">
+            <a:extLst>
+              <a:ext uri="{FF2B5EF4-FFF2-40B4-BE49-F238E27FC236}">
+                <a16:creationId xmlns:a16="http://schemas.microsoft.com/office/drawing/2014/main" id="{DFF0EEAC-F6DD-ABCE-1B36-5B1F42535465}"/>
+              </a:ext>
+            </a:extLst>
+          </p:cNvPr>
+          <p:cNvCxnSpPr>
+            <a:cxnSpLocks/>
+          </p:cNvCxnSpPr>
+          <p:nvPr/>
+        </p:nvCxnSpPr>
+        <p:spPr>
+          <a:xfrm>
+            <a:off x="4655349" y="2721181"/>
+            <a:ext cx="2341118" cy="0"/>
+          </a:xfrm>
+          <a:prstGeom prst="line">
+            <a:avLst/>
+          </a:prstGeom>
+          <a:ln>
+            <a:solidFill>
+              <a:schemeClr val="bg1"/>
+            </a:solidFill>
+          </a:ln>
+        </p:spPr>
+        <p:style>
+          <a:lnRef idx="2">
+            <a:schemeClr val="accent1"/>
+          </a:lnRef>
+          <a:fillRef idx="0">
+            <a:schemeClr val="accent1"/>
+          </a:fillRef>
+          <a:effectRef idx="1">
+            <a:schemeClr val="accent1"/>
+          </a:effectRef>
+          <a:fontRef idx="minor">
+            <a:schemeClr val="tx1"/>
+          </a:fontRef>
+        </p:style>
+      </p:cxnSp>
+    </p:spTree>
+    <p:extLst>
+      <p:ext uri="{BB962C8B-B14F-4D97-AF65-F5344CB8AC3E}">
+        <p14:creationId xmlns:p14="http://schemas.microsoft.com/office/powerpoint/2010/main" val="3092508274"/>
+      </p:ext>
+    </p:extLst>
+  </p:cSld>
+  <p:clrMapOvr>
+    <a:masterClrMapping/>
+  </p:clrMapOvr>
+</p:sld>
+</file>
+
+<file path=ppt/slides/slide2.xml><?xml version="1.0" encoding="utf-8"?>
+<p:sld xmlns:a="http://schemas.openxmlformats.org/drawingml/2006/main" xmlns:r="http://schemas.openxmlformats.org/officeDocument/2006/relationships" xmlns:p="http://schemas.openxmlformats.org/presentationml/2006/main">
+  <p:cSld>
+    <p:spTree>
+      <p:nvGrpSpPr>
+        <p:cNvPr id="1" name=""/>
+        <p:cNvGrpSpPr/>
+        <p:nvPr/>
+      </p:nvGrpSpPr>
+      <p:grpSpPr>
+        <a:xfrm>
+          <a:off x="0" y="0"/>
+          <a:ext cx="0" cy="0"/>
+          <a:chOff x="0" y="0"/>
+          <a:chExt cx="0" cy="0"/>
+        </a:xfrm>
+      </p:grpSpPr>
+      <p:sp>
+        <p:nvSpPr>
+          <p:cNvPr id="4" name="Téglalap 3">
+            <a:extLst>
+              <a:ext uri="{FF2B5EF4-FFF2-40B4-BE49-F238E27FC236}">
+                <a16:creationId xmlns:a16="http://schemas.microsoft.com/office/drawing/2014/main" id="{94EA9B0A-2FAF-D172-6FC3-53A6D4E0D423}"/>
+              </a:ext>
+            </a:extLst>
+          </p:cNvPr>
+          <p:cNvSpPr/>
+          <p:nvPr/>
+        </p:nvSpPr>
+        <p:spPr>
+          <a:xfrm>
+            <a:off x="1749551" y="169164"/>
+            <a:ext cx="8692898" cy="6519672"/>
+          </a:xfrm>
+          <a:prstGeom prst="rect">
+            <a:avLst/>
+          </a:prstGeom>
+          <a:noFill/>
+          <a:ln>
+            <a:noFill/>
+          </a:ln>
+        </p:spPr>
+        <p:style>
+          <a:lnRef idx="2">
+            <a:schemeClr val="accent1">
+              <a:shade val="15000"/>
+            </a:schemeClr>
+          </a:lnRef>
+          <a:fillRef idx="1">
+            <a:schemeClr val="accent1"/>
+          </a:fillRef>
+          <a:effectRef idx="0">
+            <a:schemeClr val="accent1"/>
+          </a:effectRef>
+          <a:fontRef idx="minor">
+            <a:schemeClr val="lt1"/>
+          </a:fontRef>
+        </p:style>
+        <p:txBody>
+          <a:bodyPr rtlCol="0" anchor="ctr"/>
+          <a:lstStyle/>
+          <a:p>
+            <a:pPr algn="ctr"/>
+            <a:endParaRPr lang="hu-HU"/>
+          </a:p>
+        </p:txBody>
+      </p:sp>
+      <p:sp>
+        <p:nvSpPr>
+          <p:cNvPr id="5" name="Téglalap 4">
+            <a:extLst>
+              <a:ext uri="{FF2B5EF4-FFF2-40B4-BE49-F238E27FC236}">
+                <a16:creationId xmlns:a16="http://schemas.microsoft.com/office/drawing/2014/main" id="{DA2DDC5E-7022-9E6C-C838-ADCE9D1414AE}"/>
+              </a:ext>
+            </a:extLst>
+          </p:cNvPr>
+          <p:cNvSpPr/>
+          <p:nvPr/>
+        </p:nvSpPr>
+        <p:spPr>
+          <a:xfrm>
+            <a:off x="1749551" y="788408"/>
+            <a:ext cx="2182369" cy="5900428"/>
+          </a:xfrm>
+          <a:prstGeom prst="rect">
+            <a:avLst/>
+          </a:prstGeom>
+          <a:solidFill>
+            <a:srgbClr val="26262C"/>
+          </a:solidFill>
+          <a:ln>
+            <a:noFill/>
+          </a:ln>
+        </p:spPr>
+        <p:style>
+          <a:lnRef idx="2">
+            <a:schemeClr val="accent1">
+              <a:shade val="15000"/>
+            </a:schemeClr>
+          </a:lnRef>
+          <a:fillRef idx="1">
+            <a:schemeClr val="accent1"/>
+          </a:fillRef>
+          <a:effectRef idx="0">
+            <a:schemeClr val="accent1"/>
+          </a:effectRef>
+          <a:fontRef idx="minor">
+            <a:schemeClr val="lt1"/>
+          </a:fontRef>
+        </p:style>
+        <p:txBody>
+          <a:bodyPr rtlCol="0" anchor="ctr"/>
+          <a:lstStyle/>
+          <a:p>
+            <a:pPr algn="ctr"/>
+            <a:endParaRPr lang="hu-HU" dirty="0"/>
+          </a:p>
+        </p:txBody>
+      </p:sp>
+      <p:sp>
+        <p:nvSpPr>
+          <p:cNvPr id="6" name="Téglalap 5">
+            <a:extLst>
+              <a:ext uri="{FF2B5EF4-FFF2-40B4-BE49-F238E27FC236}">
+                <a16:creationId xmlns:a16="http://schemas.microsoft.com/office/drawing/2014/main" id="{2BCB59C4-FD78-3B6C-8904-2A69E3FF17C4}"/>
+              </a:ext>
+            </a:extLst>
+          </p:cNvPr>
+          <p:cNvSpPr/>
+          <p:nvPr/>
+        </p:nvSpPr>
+        <p:spPr>
+          <a:xfrm>
+            <a:off x="3931920" y="788408"/>
+            <a:ext cx="2295144" cy="5900428"/>
+          </a:xfrm>
+          <a:prstGeom prst="rect">
+            <a:avLst/>
+          </a:prstGeom>
+          <a:solidFill>
+            <a:srgbClr val="181F24"/>
+          </a:solidFill>
+          <a:ln>
+            <a:noFill/>
+          </a:ln>
+        </p:spPr>
+        <p:style>
+          <a:lnRef idx="2">
+            <a:schemeClr val="accent1">
+              <a:shade val="15000"/>
+            </a:schemeClr>
+          </a:lnRef>
+          <a:fillRef idx="1">
+            <a:schemeClr val="accent1"/>
+          </a:fillRef>
+          <a:effectRef idx="0">
+            <a:schemeClr val="accent1"/>
+          </a:effectRef>
+          <a:fontRef idx="minor">
+            <a:schemeClr val="lt1"/>
+          </a:fontRef>
+        </p:style>
+        <p:txBody>
+          <a:bodyPr rtlCol="0" anchor="ctr"/>
+          <a:lstStyle/>
+          <a:p>
+            <a:pPr algn="ctr"/>
+            <a:endParaRPr lang="hu-HU"/>
+          </a:p>
+        </p:txBody>
+      </p:sp>
+      <p:sp>
+        <p:nvSpPr>
+          <p:cNvPr id="7" name="Téglalap 6">
+            <a:extLst>
+              <a:ext uri="{FF2B5EF4-FFF2-40B4-BE49-F238E27FC236}">
+                <a16:creationId xmlns:a16="http://schemas.microsoft.com/office/drawing/2014/main" id="{6C9B83E0-6DC8-EAC1-B826-768D5EF6F301}"/>
+              </a:ext>
+            </a:extLst>
+          </p:cNvPr>
+          <p:cNvSpPr/>
+          <p:nvPr/>
+        </p:nvSpPr>
+        <p:spPr>
+          <a:xfrm>
+            <a:off x="6227064" y="788408"/>
+            <a:ext cx="4215385" cy="5900428"/>
+          </a:xfrm>
+          <a:prstGeom prst="rect">
+            <a:avLst/>
+          </a:prstGeom>
+          <a:solidFill>
+            <a:srgbClr val="181F24"/>
+          </a:solidFill>
+          <a:ln>
+            <a:noFill/>
+          </a:ln>
+        </p:spPr>
+        <p:style>
+          <a:lnRef idx="2">
+            <a:schemeClr val="accent1">
+              <a:shade val="15000"/>
+            </a:schemeClr>
+          </a:lnRef>
+          <a:fillRef idx="1">
+            <a:schemeClr val="accent1"/>
+          </a:fillRef>
+          <a:effectRef idx="0">
+            <a:schemeClr val="accent1"/>
+          </a:effectRef>
+          <a:fontRef idx="minor">
+            <a:schemeClr val="lt1"/>
+          </a:fontRef>
+        </p:style>
+        <p:txBody>
+          <a:bodyPr rtlCol="0" anchor="ctr"/>
+          <a:lstStyle/>
+          <a:p>
+            <a:pPr algn="ctr"/>
+            <a:endParaRPr lang="hu-HU"/>
+          </a:p>
+        </p:txBody>
+      </p:sp>
+      <p:sp>
+        <p:nvSpPr>
+          <p:cNvPr id="9" name="Téglalap 8">
+            <a:extLst>
+              <a:ext uri="{FF2B5EF4-FFF2-40B4-BE49-F238E27FC236}">
+                <a16:creationId xmlns:a16="http://schemas.microsoft.com/office/drawing/2014/main" id="{8080EEB1-3508-DA23-822D-780D88F13086}"/>
+              </a:ext>
+            </a:extLst>
+          </p:cNvPr>
+          <p:cNvSpPr/>
+          <p:nvPr/>
+        </p:nvSpPr>
+        <p:spPr>
+          <a:xfrm>
+            <a:off x="1749551" y="0"/>
+            <a:ext cx="8692898" cy="169164"/>
+          </a:xfrm>
+          <a:prstGeom prst="rect">
+            <a:avLst/>
+          </a:prstGeom>
+          <a:solidFill>
+            <a:schemeClr val="bg1">
+              <a:lumMod val="85000"/>
+            </a:schemeClr>
+          </a:solidFill>
+          <a:ln>
+            <a:noFill/>
+          </a:ln>
+        </p:spPr>
+        <p:style>
+          <a:lnRef idx="2">
+            <a:schemeClr val="dk1"/>
+          </a:lnRef>
+          <a:fillRef idx="1">
+            <a:schemeClr val="lt1"/>
+          </a:fillRef>
+          <a:effectRef idx="0">
+            <a:schemeClr val="dk1"/>
+          </a:effectRef>
+          <a:fontRef idx="minor">
+            <a:schemeClr val="dk1"/>
+          </a:fontRef>
+        </p:style>
+        <p:txBody>
+          <a:bodyPr rtlCol="0" anchor="ctr"/>
+          <a:lstStyle/>
+          <a:p>
+            <a:pPr algn="ctr"/>
+            <a:endParaRPr lang="hu-HU"/>
+          </a:p>
+        </p:txBody>
+      </p:sp>
+      <p:sp>
+        <p:nvSpPr>
+          <p:cNvPr id="10" name="Téglalap 9">
+            <a:extLst>
+              <a:ext uri="{FF2B5EF4-FFF2-40B4-BE49-F238E27FC236}">
+                <a16:creationId xmlns:a16="http://schemas.microsoft.com/office/drawing/2014/main" id="{C8DDB6D0-DD1A-B80E-62AB-48EF386DF3C5}"/>
+              </a:ext>
+            </a:extLst>
+          </p:cNvPr>
+          <p:cNvSpPr/>
+          <p:nvPr/>
+        </p:nvSpPr>
+        <p:spPr>
+          <a:xfrm>
+            <a:off x="10153650" y="0"/>
+            <a:ext cx="288799" cy="169164"/>
+          </a:xfrm>
+          <a:prstGeom prst="rect">
+            <a:avLst/>
+          </a:prstGeom>
+          <a:solidFill>
+            <a:srgbClr val="FF0000"/>
+          </a:solidFill>
+          <a:ln>
+            <a:noFill/>
+          </a:ln>
+        </p:spPr>
+        <p:style>
+          <a:lnRef idx="2">
+            <a:schemeClr val="accent1">
+              <a:shade val="15000"/>
+            </a:schemeClr>
+          </a:lnRef>
+          <a:fillRef idx="1">
+            <a:schemeClr val="accent1"/>
+          </a:fillRef>
+          <a:effectRef idx="0">
+            <a:schemeClr val="accent1"/>
+          </a:effectRef>
+          <a:fontRef idx="minor">
+            <a:schemeClr val="lt1"/>
+          </a:fontRef>
+        </p:style>
+        <p:txBody>
+          <a:bodyPr rtlCol="0" anchor="ctr"/>
+          <a:lstStyle/>
+          <a:p>
+            <a:pPr algn="ctr"/>
+            <a:r>
+              <a:rPr lang="hu-HU" sz="1100" dirty="0"/>
+              <a:t>X</a:t>
+            </a:r>
+          </a:p>
+        </p:txBody>
+      </p:sp>
+      <p:sp>
+        <p:nvSpPr>
+          <p:cNvPr id="11" name="Téglalap 10">
+            <a:extLst>
+              <a:ext uri="{FF2B5EF4-FFF2-40B4-BE49-F238E27FC236}">
+                <a16:creationId xmlns:a16="http://schemas.microsoft.com/office/drawing/2014/main" id="{9C00880D-EBAE-51DF-D511-12995B5F7C15}"/>
+              </a:ext>
+            </a:extLst>
+          </p:cNvPr>
+          <p:cNvSpPr/>
+          <p:nvPr/>
+        </p:nvSpPr>
+        <p:spPr>
+          <a:xfrm>
+            <a:off x="9864851" y="0"/>
+            <a:ext cx="288799" cy="169164"/>
+          </a:xfrm>
+          <a:prstGeom prst="rect">
+            <a:avLst/>
+          </a:prstGeom>
+          <a:solidFill>
+            <a:schemeClr val="accent1">
+              <a:lumMod val="60000"/>
+              <a:lumOff val="40000"/>
+            </a:schemeClr>
+          </a:solidFill>
+          <a:ln>
+            <a:noFill/>
+          </a:ln>
+        </p:spPr>
+        <p:style>
+          <a:lnRef idx="2">
+            <a:schemeClr val="accent1">
+              <a:shade val="15000"/>
+            </a:schemeClr>
+          </a:lnRef>
+          <a:fillRef idx="1">
+            <a:schemeClr val="accent1"/>
+          </a:fillRef>
+          <a:effectRef idx="0">
+            <a:schemeClr val="accent1"/>
+          </a:effectRef>
+          <a:fontRef idx="minor">
+            <a:schemeClr val="lt1"/>
+          </a:fontRef>
+        </p:style>
+        <p:txBody>
+          <a:bodyPr rtlCol="0" anchor="ctr"/>
+          <a:lstStyle/>
+          <a:p>
+            <a:pPr algn="ctr"/>
+            <a:r>
+              <a:rPr lang="hu-HU" sz="1200" dirty="0">
+                <a:latin typeface="Alien Encounters" panose="00000400000000000000" pitchFamily="2" charset="0"/>
+              </a:rPr>
+              <a:t>O</a:t>
+            </a:r>
+            <a:endParaRPr lang="hu-HU" dirty="0">
+              <a:latin typeface="Alien Encounters" panose="00000400000000000000" pitchFamily="2" charset="0"/>
+            </a:endParaRPr>
+          </a:p>
+        </p:txBody>
+      </p:sp>
+      <p:sp>
+        <p:nvSpPr>
+          <p:cNvPr id="12" name="Téglalap 11">
+            <a:extLst>
+              <a:ext uri="{FF2B5EF4-FFF2-40B4-BE49-F238E27FC236}">
+                <a16:creationId xmlns:a16="http://schemas.microsoft.com/office/drawing/2014/main" id="{70251261-4E5B-BEBB-8685-8FD168CE355F}"/>
+              </a:ext>
+            </a:extLst>
+          </p:cNvPr>
+          <p:cNvSpPr/>
+          <p:nvPr/>
+        </p:nvSpPr>
+        <p:spPr>
+          <a:xfrm>
+            <a:off x="9576052" y="0"/>
+            <a:ext cx="288799" cy="169164"/>
+          </a:xfrm>
+          <a:prstGeom prst="rect">
+            <a:avLst/>
+          </a:prstGeom>
+          <a:solidFill>
+            <a:schemeClr val="accent1">
+              <a:lumMod val="60000"/>
+              <a:lumOff val="40000"/>
+            </a:schemeClr>
+          </a:solidFill>
+          <a:ln>
+            <a:noFill/>
+          </a:ln>
+        </p:spPr>
+        <p:style>
+          <a:lnRef idx="2">
+            <a:schemeClr val="accent1">
+              <a:shade val="15000"/>
+            </a:schemeClr>
+          </a:lnRef>
+          <a:fillRef idx="1">
+            <a:schemeClr val="accent1"/>
+          </a:fillRef>
+          <a:effectRef idx="0">
+            <a:schemeClr val="accent1"/>
+          </a:effectRef>
+          <a:fontRef idx="minor">
+            <a:schemeClr val="lt1"/>
+          </a:fontRef>
+        </p:style>
+        <p:txBody>
+          <a:bodyPr rtlCol="0" anchor="ctr"/>
+          <a:lstStyle/>
+          <a:p>
+            <a:pPr algn="ctr"/>
+            <a:r>
+              <a:rPr lang="hu-HU" dirty="0"/>
+              <a:t>-</a:t>
+            </a:r>
+          </a:p>
+        </p:txBody>
+      </p:sp>
+      <p:sp>
+        <p:nvSpPr>
+          <p:cNvPr id="14" name="Szövegdoboz 13">
+            <a:extLst>
+              <a:ext uri="{FF2B5EF4-FFF2-40B4-BE49-F238E27FC236}">
+                <a16:creationId xmlns:a16="http://schemas.microsoft.com/office/drawing/2014/main" id="{934387DE-0D49-BF55-36A7-1A2D99EB59EB}"/>
+              </a:ext>
+            </a:extLst>
+          </p:cNvPr>
+          <p:cNvSpPr txBox="1"/>
+          <p:nvPr/>
+        </p:nvSpPr>
+        <p:spPr>
+          <a:xfrm>
+            <a:off x="1819083" y="782312"/>
+            <a:ext cx="2027879" cy="3170099"/>
+          </a:xfrm>
+          <a:prstGeom prst="rect">
+            <a:avLst/>
+          </a:prstGeom>
+          <a:noFill/>
+          <a:ln>
+            <a:noFill/>
+          </a:ln>
+        </p:spPr>
+        <p:txBody>
+          <a:bodyPr wrap="square" rtlCol="0">
+            <a:spAutoFit/>
+          </a:bodyPr>
+          <a:lstStyle/>
+          <a:p>
+            <a:r>
+              <a:rPr lang="hu-HU" dirty="0">
+                <a:solidFill>
+                  <a:schemeClr val="bg1"/>
+                </a:solidFill>
+              </a:rPr>
+              <a:t>Minden bejegyzés</a:t>
+            </a:r>
+          </a:p>
+          <a:p>
+            <a:r>
+              <a:rPr lang="hu-HU" dirty="0">
+                <a:solidFill>
+                  <a:schemeClr val="bg1"/>
+                </a:solidFill>
+              </a:rPr>
+              <a:t>Kategóriák</a:t>
+            </a:r>
+          </a:p>
+          <a:p>
+            <a:r>
+              <a:rPr lang="hu-HU" dirty="0">
+                <a:solidFill>
+                  <a:schemeClr val="bg1"/>
+                </a:solidFill>
+              </a:rPr>
+              <a:t>   </a:t>
+            </a:r>
+            <a:r>
+              <a:rPr lang="hu-HU" sz="1600" dirty="0">
+                <a:solidFill>
+                  <a:schemeClr val="bg1"/>
+                </a:solidFill>
+              </a:rPr>
+              <a:t>Jelszavak</a:t>
+            </a:r>
+          </a:p>
+          <a:p>
+            <a:r>
+              <a:rPr lang="hu-HU" sz="1600" dirty="0">
+                <a:solidFill>
+                  <a:schemeClr val="bg1"/>
+                </a:solidFill>
+              </a:rPr>
+              <a:t>   Bankkártyák</a:t>
+            </a:r>
+          </a:p>
+          <a:p>
+            <a:r>
+              <a:rPr lang="hu-HU" sz="1600" dirty="0">
+                <a:solidFill>
+                  <a:schemeClr val="bg1"/>
+                </a:solidFill>
+              </a:rPr>
+              <a:t>   Jegyzetek</a:t>
+            </a:r>
+          </a:p>
+          <a:p>
+            <a:r>
+              <a:rPr lang="hu-HU" sz="1600" dirty="0">
+                <a:solidFill>
+                  <a:schemeClr val="bg1"/>
+                </a:solidFill>
+              </a:rPr>
+              <a:t>   Kártyák</a:t>
+            </a:r>
+          </a:p>
+          <a:p>
+            <a:r>
+              <a:rPr lang="hu-HU" sz="1600" dirty="0">
+                <a:solidFill>
+                  <a:schemeClr val="bg1"/>
+                </a:solidFill>
+              </a:rPr>
+              <a:t>   Email</a:t>
+            </a:r>
+          </a:p>
+          <a:p>
+            <a:endParaRPr lang="hu-HU" sz="1600" dirty="0">
+              <a:solidFill>
+                <a:schemeClr val="bg1"/>
+              </a:solidFill>
+            </a:endParaRPr>
+          </a:p>
+          <a:p>
+            <a:endParaRPr lang="hu-HU" sz="1600" dirty="0">
+              <a:solidFill>
+                <a:schemeClr val="bg1"/>
+              </a:solidFill>
+            </a:endParaRPr>
+          </a:p>
+          <a:p>
+            <a:endParaRPr lang="hu-HU" sz="1600" dirty="0">
+              <a:solidFill>
+                <a:schemeClr val="bg1"/>
+              </a:solidFill>
+            </a:endParaRPr>
+          </a:p>
+          <a:p>
+            <a:endParaRPr lang="hu-HU" sz="1600" dirty="0">
+              <a:solidFill>
+                <a:schemeClr val="bg1"/>
+              </a:solidFill>
+            </a:endParaRPr>
+          </a:p>
+          <a:p>
+            <a:r>
+              <a:rPr lang="hu-HU" dirty="0">
+                <a:solidFill>
+                  <a:schemeClr val="bg1"/>
+                </a:solidFill>
+              </a:rPr>
+              <a:t>Beállítások</a:t>
+            </a:r>
+            <a:endParaRPr lang="hu-HU" sz="1600" dirty="0">
+              <a:solidFill>
+                <a:schemeClr val="bg1"/>
+              </a:solidFill>
+            </a:endParaRPr>
+          </a:p>
+        </p:txBody>
+      </p:sp>
+      <p:cxnSp>
+        <p:nvCxnSpPr>
+          <p:cNvPr id="16" name="Egyenes összekötő 15">
+            <a:extLst>
+              <a:ext uri="{FF2B5EF4-FFF2-40B4-BE49-F238E27FC236}">
+                <a16:creationId xmlns:a16="http://schemas.microsoft.com/office/drawing/2014/main" id="{C304AF26-63D6-F62E-95D7-492C2741964A}"/>
+              </a:ext>
+            </a:extLst>
+          </p:cNvPr>
+          <p:cNvCxnSpPr>
+            <a:cxnSpLocks/>
+          </p:cNvCxnSpPr>
+          <p:nvPr/>
+        </p:nvCxnSpPr>
+        <p:spPr>
+          <a:xfrm>
+            <a:off x="1906904" y="1371100"/>
+            <a:ext cx="1455040" cy="0"/>
+          </a:xfrm>
+          <a:prstGeom prst="line">
+            <a:avLst/>
+          </a:prstGeom>
+          <a:ln>
+            <a:solidFill>
+              <a:schemeClr val="bg1"/>
+            </a:solidFill>
+          </a:ln>
+        </p:spPr>
+        <p:style>
+          <a:lnRef idx="2">
+            <a:schemeClr val="accent1"/>
+          </a:lnRef>
+          <a:fillRef idx="0">
+            <a:schemeClr val="accent1"/>
+          </a:fillRef>
+          <a:effectRef idx="1">
+            <a:schemeClr val="accent1"/>
+          </a:effectRef>
+          <a:fontRef idx="minor">
+            <a:schemeClr val="tx1"/>
+          </a:fontRef>
+        </p:style>
+      </p:cxnSp>
+      <p:sp>
+        <p:nvSpPr>
+          <p:cNvPr id="19" name="Szövegdoboz 18">
+            <a:extLst>
+              <a:ext uri="{FF2B5EF4-FFF2-40B4-BE49-F238E27FC236}">
+                <a16:creationId xmlns:a16="http://schemas.microsoft.com/office/drawing/2014/main" id="{B50487E9-EB8C-0F98-A2C4-7F7804145B93}"/>
+              </a:ext>
+            </a:extLst>
+          </p:cNvPr>
+          <p:cNvSpPr txBox="1"/>
+          <p:nvPr/>
+        </p:nvSpPr>
+        <p:spPr>
+          <a:xfrm>
+            <a:off x="3931919" y="793051"/>
+            <a:ext cx="2498026" cy="369332"/>
+          </a:xfrm>
+          <a:prstGeom prst="rect">
+            <a:avLst/>
+          </a:prstGeom>
+          <a:noFill/>
+          <a:ln>
+            <a:noFill/>
+          </a:ln>
+        </p:spPr>
+        <p:txBody>
+          <a:bodyPr wrap="square" rtlCol="0">
+            <a:spAutoFit/>
+          </a:bodyPr>
+          <a:lstStyle/>
+          <a:p>
+            <a:r>
+              <a:rPr lang="hu-HU" b="1" dirty="0">
+                <a:solidFill>
+                  <a:schemeClr val="bg1"/>
+                </a:solidFill>
+              </a:rPr>
+              <a:t>Minden bejegyzés</a:t>
+            </a:r>
+          </a:p>
+        </p:txBody>
+      </p:sp>
+      <p:sp>
+        <p:nvSpPr>
+          <p:cNvPr id="21" name="Téglalap 20">
+            <a:extLst>
+              <a:ext uri="{FF2B5EF4-FFF2-40B4-BE49-F238E27FC236}">
+                <a16:creationId xmlns:a16="http://schemas.microsoft.com/office/drawing/2014/main" id="{0F2F24FB-17A0-7341-8DE1-D80FB9E4069F}"/>
+              </a:ext>
+            </a:extLst>
+          </p:cNvPr>
+          <p:cNvSpPr/>
+          <p:nvPr/>
+        </p:nvSpPr>
+        <p:spPr>
+          <a:xfrm>
+            <a:off x="1749551" y="169164"/>
+            <a:ext cx="8692898" cy="619244"/>
+          </a:xfrm>
+          <a:prstGeom prst="rect">
+            <a:avLst/>
+          </a:prstGeom>
+          <a:solidFill>
+            <a:srgbClr val="0A0064"/>
+          </a:solidFill>
+          <a:ln>
+            <a:noFill/>
+          </a:ln>
+        </p:spPr>
+        <p:style>
+          <a:lnRef idx="2">
+            <a:schemeClr val="accent1">
+              <a:shade val="15000"/>
+            </a:schemeClr>
+          </a:lnRef>
+          <a:fillRef idx="1">
+            <a:schemeClr val="accent1"/>
+          </a:fillRef>
+          <a:effectRef idx="0">
+            <a:schemeClr val="accent1"/>
+          </a:effectRef>
+          <a:fontRef idx="minor">
+            <a:schemeClr val="lt1"/>
+          </a:fontRef>
+        </p:style>
+        <p:txBody>
+          <a:bodyPr rtlCol="0" anchor="ctr"/>
+          <a:lstStyle/>
+          <a:p>
+            <a:pPr algn="ctr"/>
+            <a:endParaRPr lang="hu-HU"/>
+          </a:p>
+        </p:txBody>
+      </p:sp>
+      <p:sp>
+        <p:nvSpPr>
+          <p:cNvPr id="22" name="Szövegdoboz 21">
+            <a:extLst>
+              <a:ext uri="{FF2B5EF4-FFF2-40B4-BE49-F238E27FC236}">
+                <a16:creationId xmlns:a16="http://schemas.microsoft.com/office/drawing/2014/main" id="{C2AF8786-1F55-A491-D073-CE5AE6B72722}"/>
+              </a:ext>
+            </a:extLst>
+          </p:cNvPr>
+          <p:cNvSpPr txBox="1"/>
+          <p:nvPr/>
+        </p:nvSpPr>
+        <p:spPr>
+          <a:xfrm>
+            <a:off x="4454303" y="296967"/>
+            <a:ext cx="1542860" cy="338554"/>
+          </a:xfrm>
+          <a:prstGeom prst="rect">
+            <a:avLst/>
+          </a:prstGeom>
+          <a:noFill/>
+          <a:ln>
+            <a:noFill/>
+          </a:ln>
         </p:spPr>
         <p:txBody>
           <a:bodyPr wrap="square" rtlCol="0">
@@ -4105,13 +4935,16 @@
         </p:nvSpPr>
         <p:spPr>
           <a:xfrm>
-            <a:off x="1689089" y="250299"/>
+            <a:off x="1768220" y="250299"/>
             <a:ext cx="2448184" cy="461665"/>
           </a:xfrm>
           <a:prstGeom prst="rect">
             <a:avLst/>
           </a:prstGeom>
           <a:noFill/>
+          <a:ln>
+            <a:noFill/>
+          </a:ln>
         </p:spPr>
         <p:txBody>
           <a:bodyPr wrap="square" rtlCol="0">
@@ -4124,7 +4957,7 @@
                 <a:solidFill>
                   <a:schemeClr val="bg1"/>
                 </a:solidFill>
-                <a:latin typeface="Distant Galaxy" panose="00000400000000000000" pitchFamily="2" charset="0"/>
+                <a:latin typeface="Impact" panose="020B0806030902050204" pitchFamily="34" charset="0"/>
                 <a:cs typeface="Aharoni" panose="02010803020104030203" pitchFamily="2" charset="-79"/>
               </a:rPr>
               <a:t>Vault</a:t>
@@ -4134,7 +4967,7 @@
                 <a:solidFill>
                   <a:schemeClr val="bg1"/>
                 </a:solidFill>
-                <a:latin typeface="Distant Galaxy" panose="00000400000000000000" pitchFamily="2" charset="0"/>
+                <a:latin typeface="Impact" panose="020B0806030902050204" pitchFamily="34" charset="0"/>
                 <a:cs typeface="Aharoni" panose="02010803020104030203" pitchFamily="2" charset="-79"/>
               </a:rPr>
               <a:t> </a:t>
@@ -4144,7 +4977,7 @@
                 <a:solidFill>
                   <a:schemeClr val="bg1"/>
                 </a:solidFill>
-                <a:latin typeface="Distant Galaxy" panose="00000400000000000000" pitchFamily="2" charset="0"/>
+                <a:latin typeface="Impact" panose="020B0806030902050204" pitchFamily="34" charset="0"/>
                 <a:cs typeface="Aharoni" panose="02010803020104030203" pitchFamily="2" charset="-79"/>
               </a:rPr>
               <a:t>Vader</a:t>
@@ -4153,7 +4986,7 @@
               <a:solidFill>
                 <a:schemeClr val="bg1"/>
               </a:solidFill>
-              <a:latin typeface="Distant Galaxy" panose="00000400000000000000" pitchFamily="2" charset="0"/>
+              <a:latin typeface="Impact" panose="020B0806030902050204" pitchFamily="34" charset="0"/>
               <a:cs typeface="Aharoni" panose="02010803020104030203" pitchFamily="2" charset="-79"/>
             </a:endParaRPr>
           </a:p>
@@ -4187,7 +5020,7 @@
         </p:blipFill>
         <p:spPr>
           <a:xfrm>
-            <a:off x="3859394" y="303951"/>
+            <a:off x="3393405" y="303951"/>
             <a:ext cx="369332" cy="369332"/>
           </a:xfrm>
           <a:prstGeom prst="rect">
@@ -4217,9 +5050,7 @@
           </a:prstGeom>
           <a:ln>
             <a:solidFill>
-              <a:schemeClr val="bg1">
-                <a:lumMod val="85000"/>
-              </a:schemeClr>
+              <a:schemeClr val="bg1"/>
             </a:solidFill>
           </a:ln>
         </p:spPr>
@@ -5016,6 +5847,11 @@
           <a:prstGeom prst="line">
             <a:avLst/>
           </a:prstGeom>
+          <a:ln>
+            <a:solidFill>
+              <a:schemeClr val="bg1"/>
+            </a:solidFill>
+          </a:ln>
         </p:spPr>
         <p:style>
           <a:lnRef idx="2">

</xml_diff>